<commit_message>
Instructions PDF final ver
</commit_message>
<xml_diff>
--- a/dist/howtouse/Instructions.pptx
+++ b/dist/howtouse/Instructions.pptx
@@ -5,17 +5,13 @@
     <p:sldMasterId id="2147483648" r:id="rId1"/>
   </p:sldMasterIdLst>
   <p:notesMasterIdLst>
-    <p:notesMasterId r:id="rId10"/>
+    <p:notesMasterId r:id="rId6"/>
   </p:notesMasterIdLst>
   <p:sldIdLst>
     <p:sldId id="256" r:id="rId2"/>
-    <p:sldId id="261" r:id="rId3"/>
-    <p:sldId id="262" r:id="rId4"/>
-    <p:sldId id="263" r:id="rId5"/>
-    <p:sldId id="264" r:id="rId6"/>
-    <p:sldId id="266" r:id="rId7"/>
-    <p:sldId id="267" r:id="rId8"/>
-    <p:sldId id="268" r:id="rId9"/>
+    <p:sldId id="263" r:id="rId3"/>
+    <p:sldId id="266" r:id="rId4"/>
+    <p:sldId id="268" r:id="rId5"/>
   </p:sldIdLst>
   <p:sldSz cx="9144000" cy="6858000" type="screen4x3"/>
   <p:notesSz cx="6858000" cy="9144000"/>
@@ -215,7 +211,7 @@
           <a:p>
             <a:fld id="{0E3B8505-7A21-4DD3-81B2-C2AA79CEC66D}" type="datetimeFigureOut">
               <a:rPr lang="en-US" smtClean="0"/>
-              <a:t>2/22/2015</a:t>
+              <a:t>3/8/2015</a:t>
             </a:fld>
             <a:endParaRPr lang="en-US"/>
           </a:p>
@@ -548,7 +544,7 @@
           <a:p>
             <a:fld id="{B87063B8-C8D0-463A-A663-E9162E77B39E}" type="slidenum">
               <a:rPr lang="en-US" smtClean="0"/>
-              <a:t>4</a:t>
+              <a:t>2</a:t>
             </a:fld>
             <a:endParaRPr lang="en-US"/>
           </a:p>
@@ -748,7 +744,7 @@
           <a:p>
             <a:fld id="{2FD1208F-E5F8-478F-981A-24C260511B54}" type="datetimeFigureOut">
               <a:rPr lang="en-US" smtClean="0"/>
-              <a:t>2/22/2015</a:t>
+              <a:t>3/8/2015</a:t>
             </a:fld>
             <a:endParaRPr lang="en-US"/>
           </a:p>
@@ -918,7 +914,7 @@
           <a:p>
             <a:fld id="{2FD1208F-E5F8-478F-981A-24C260511B54}" type="datetimeFigureOut">
               <a:rPr lang="en-US" smtClean="0"/>
-              <a:t>2/22/2015</a:t>
+              <a:t>3/8/2015</a:t>
             </a:fld>
             <a:endParaRPr lang="en-US"/>
           </a:p>
@@ -1098,7 +1094,7 @@
           <a:p>
             <a:fld id="{2FD1208F-E5F8-478F-981A-24C260511B54}" type="datetimeFigureOut">
               <a:rPr lang="en-US" smtClean="0"/>
-              <a:t>2/22/2015</a:t>
+              <a:t>3/8/2015</a:t>
             </a:fld>
             <a:endParaRPr lang="en-US"/>
           </a:p>
@@ -1268,7 +1264,7 @@
           <a:p>
             <a:fld id="{2FD1208F-E5F8-478F-981A-24C260511B54}" type="datetimeFigureOut">
               <a:rPr lang="en-US" smtClean="0"/>
-              <a:t>2/22/2015</a:t>
+              <a:t>3/8/2015</a:t>
             </a:fld>
             <a:endParaRPr lang="en-US"/>
           </a:p>
@@ -1514,7 +1510,7 @@
           <a:p>
             <a:fld id="{2FD1208F-E5F8-478F-981A-24C260511B54}" type="datetimeFigureOut">
               <a:rPr lang="en-US" smtClean="0"/>
-              <a:t>2/22/2015</a:t>
+              <a:t>3/8/2015</a:t>
             </a:fld>
             <a:endParaRPr lang="en-US"/>
           </a:p>
@@ -1802,7 +1798,7 @@
           <a:p>
             <a:fld id="{2FD1208F-E5F8-478F-981A-24C260511B54}" type="datetimeFigureOut">
               <a:rPr lang="en-US" smtClean="0"/>
-              <a:t>2/22/2015</a:t>
+              <a:t>3/8/2015</a:t>
             </a:fld>
             <a:endParaRPr lang="en-US"/>
           </a:p>
@@ -2224,7 +2220,7 @@
           <a:p>
             <a:fld id="{2FD1208F-E5F8-478F-981A-24C260511B54}" type="datetimeFigureOut">
               <a:rPr lang="en-US" smtClean="0"/>
-              <a:t>2/22/2015</a:t>
+              <a:t>3/8/2015</a:t>
             </a:fld>
             <a:endParaRPr lang="en-US"/>
           </a:p>
@@ -2342,7 +2338,7 @@
           <a:p>
             <a:fld id="{2FD1208F-E5F8-478F-981A-24C260511B54}" type="datetimeFigureOut">
               <a:rPr lang="en-US" smtClean="0"/>
-              <a:t>2/22/2015</a:t>
+              <a:t>3/8/2015</a:t>
             </a:fld>
             <a:endParaRPr lang="en-US"/>
           </a:p>
@@ -2437,7 +2433,7 @@
           <a:p>
             <a:fld id="{2FD1208F-E5F8-478F-981A-24C260511B54}" type="datetimeFigureOut">
               <a:rPr lang="en-US" smtClean="0"/>
-              <a:t>2/22/2015</a:t>
+              <a:t>3/8/2015</a:t>
             </a:fld>
             <a:endParaRPr lang="en-US"/>
           </a:p>
@@ -2714,7 +2710,7 @@
           <a:p>
             <a:fld id="{2FD1208F-E5F8-478F-981A-24C260511B54}" type="datetimeFigureOut">
               <a:rPr lang="en-US" smtClean="0"/>
-              <a:t>2/22/2015</a:t>
+              <a:t>3/8/2015</a:t>
             </a:fld>
             <a:endParaRPr lang="en-US"/>
           </a:p>
@@ -2967,7 +2963,7 @@
           <a:p>
             <a:fld id="{2FD1208F-E5F8-478F-981A-24C260511B54}" type="datetimeFigureOut">
               <a:rPr lang="en-US" smtClean="0"/>
-              <a:t>2/22/2015</a:t>
+              <a:t>3/8/2015</a:t>
             </a:fld>
             <a:endParaRPr lang="en-US"/>
           </a:p>
@@ -3180,7 +3176,7 @@
           <a:p>
             <a:fld id="{2FD1208F-E5F8-478F-981A-24C260511B54}" type="datetimeFigureOut">
               <a:rPr lang="en-US" smtClean="0"/>
-              <a:t>2/22/2015</a:t>
+              <a:t>3/8/2015</a:t>
             </a:fld>
             <a:endParaRPr lang="en-US"/>
           </a:p>
@@ -3572,7 +3568,7 @@
           <a:p>
             <a:r>
               <a:rPr lang="en-US" dirty="0" smtClean="0"/>
-              <a:t>Debt Calculator Tutorial</a:t>
+              <a:t>Debt Calculator</a:t>
             </a:r>
             <a:endParaRPr lang="en-US" dirty="0"/>
           </a:p>
@@ -3625,55 +3621,406 @@
           <a:p>
             <a:r>
               <a:rPr lang="en-US" dirty="0" smtClean="0"/>
-              <a:t>Overview</a:t>
+              <a:t>Accounts page</a:t>
             </a:r>
             <a:endParaRPr lang="en-US" dirty="0"/>
           </a:p>
         </p:txBody>
       </p:sp>
-      <p:sp>
-        <p:nvSpPr>
-          <p:cNvPr id="6" name="Content Placeholder 5"/>
-          <p:cNvSpPr>
-            <a:spLocks noGrp="1"/>
-          </p:cNvSpPr>
-          <p:nvPr>
-            <p:ph sz="half" idx="1"/>
-          </p:nvPr>
-        </p:nvSpPr>
+      <p:pic>
+        <p:nvPicPr>
+          <p:cNvPr id="6" name="Picture 5"/>
+          <p:cNvPicPr>
+            <a:picLocks noChangeAspect="1"/>
+          </p:cNvPicPr>
+          <p:nvPr/>
+        </p:nvPicPr>
+        <p:blipFill>
+          <a:blip r:embed="rId3"/>
+          <a:stretch>
+            <a:fillRect/>
+          </a:stretch>
+        </p:blipFill>
         <p:spPr>
           <a:xfrm>
-            <a:off x="457200" y="1600200"/>
-            <a:ext cx="8229600" cy="4525963"/>
+            <a:off x="118434" y="1503114"/>
+            <a:ext cx="8907129" cy="1813287"/>
           </a:xfrm>
+          <a:prstGeom prst="rect">
+            <a:avLst/>
+          </a:prstGeom>
         </p:spPr>
-        <p:txBody>
-          <a:bodyPr>
-            <a:normAutofit/>
+      </p:pic>
+      <p:sp>
+        <p:nvSpPr>
+          <p:cNvPr id="8" name="TextBox 7"/>
+          <p:cNvSpPr txBox="1"/>
+          <p:nvPr/>
+        </p:nvSpPr>
+        <p:spPr>
+          <a:xfrm>
+            <a:off x="419099" y="3445826"/>
+            <a:ext cx="8305800" cy="2308324"/>
+          </a:xfrm>
+          <a:prstGeom prst="rect">
+            <a:avLst/>
+          </a:prstGeom>
+          <a:noFill/>
+        </p:spPr>
+        <p:txBody>
+          <a:bodyPr wrap="square" rtlCol="0">
+            <a:spAutoFit/>
           </a:bodyPr>
           <a:lstStyle/>
           <a:p>
             <a:r>
-              <a:rPr lang="en-US" sz="2000" dirty="0" smtClean="0"/>
-              <a:t>The Debt Repayment Calculator consists of four pages, an About page, a How-to page, the Accounts page, and the Reporting page. The latter two will be the focus of the tutorial.</a:t>
-            </a:r>
-          </a:p>
-          <a:p>
-            <a:endParaRPr lang="en-US" sz="2000" dirty="0"/>
-          </a:p>
-          <a:p>
-            <a:r>
-              <a:rPr lang="en-US" sz="2000" dirty="0" smtClean="0"/>
-              <a:t>This tutorial will address all the features of the calculator and walk you through how to do certain actions.</a:t>
-            </a:r>
-            <a:endParaRPr lang="en-US" sz="2000" dirty="0"/>
+              <a:rPr lang="en-US" dirty="0" smtClean="0"/>
+              <a:t>1) Name</a:t>
+            </a:r>
+            <a:r>
+              <a:rPr lang="en-US" dirty="0" smtClean="0"/>
+              <a:t>:			Field for name of account</a:t>
+            </a:r>
+          </a:p>
+          <a:p>
+            <a:r>
+              <a:rPr lang="en-US" dirty="0" smtClean="0"/>
+              <a:t>2) </a:t>
+            </a:r>
+            <a:r>
+              <a:rPr lang="en-US" dirty="0"/>
+              <a:t>APR</a:t>
+            </a:r>
+            <a:r>
+              <a:rPr lang="en-US" dirty="0" smtClean="0"/>
+              <a:t>:			Field for APR of account</a:t>
+            </a:r>
+          </a:p>
+          <a:p>
+            <a:r>
+              <a:rPr lang="en-US" dirty="0" smtClean="0"/>
+              <a:t>3) </a:t>
+            </a:r>
+            <a:r>
+              <a:rPr lang="en-US" dirty="0"/>
+              <a:t>Current </a:t>
+            </a:r>
+            <a:r>
+              <a:rPr lang="en-US" dirty="0" smtClean="0"/>
+              <a:t>Balance:		Field for Current balance in account</a:t>
+            </a:r>
+          </a:p>
+          <a:p>
+            <a:r>
+              <a:rPr lang="en-US" dirty="0" smtClean="0"/>
+              <a:t>4) </a:t>
+            </a:r>
+            <a:r>
+              <a:rPr lang="en-US" dirty="0"/>
+              <a:t>Monthly </a:t>
+            </a:r>
+            <a:r>
+              <a:rPr lang="en-US" dirty="0" smtClean="0"/>
+              <a:t>Payment:	</a:t>
+            </a:r>
+            <a:r>
+              <a:rPr lang="en-US" dirty="0" smtClean="0"/>
+              <a:t>Field </a:t>
+            </a:r>
+            <a:r>
+              <a:rPr lang="en-US" dirty="0"/>
+              <a:t>for </a:t>
+            </a:r>
+            <a:r>
+              <a:rPr lang="en-US" dirty="0" smtClean="0"/>
+              <a:t>Required monthly payment amount </a:t>
+            </a:r>
+          </a:p>
+          <a:p>
+            <a:r>
+              <a:rPr lang="en-US" dirty="0" smtClean="0"/>
+              <a:t>5) </a:t>
+            </a:r>
+            <a:r>
+              <a:rPr lang="en-US" dirty="0"/>
+              <a:t>+</a:t>
+            </a:r>
+            <a:r>
+              <a:rPr lang="en-US" dirty="0" smtClean="0"/>
+              <a:t>Add Account:		Button for adding additional accounts</a:t>
+            </a:r>
+          </a:p>
+          <a:p>
+            <a:r>
+              <a:rPr lang="en-US" dirty="0" smtClean="0"/>
+              <a:t>6) </a:t>
+            </a:r>
+            <a:r>
+              <a:rPr lang="en-US" dirty="0"/>
+              <a:t>Pencil </a:t>
+            </a:r>
+            <a:r>
+              <a:rPr lang="en-US" dirty="0" smtClean="0"/>
+              <a:t>Icon:		Button for editing account</a:t>
+            </a:r>
+          </a:p>
+          <a:p>
+            <a:r>
+              <a:rPr lang="en-US" dirty="0" smtClean="0"/>
+              <a:t>7) </a:t>
+            </a:r>
+            <a:r>
+              <a:rPr lang="en-US" dirty="0"/>
+              <a:t>Trash </a:t>
+            </a:r>
+            <a:r>
+              <a:rPr lang="en-US" dirty="0" smtClean="0"/>
+              <a:t>Icon:		Button to delete account</a:t>
+            </a:r>
+          </a:p>
+          <a:p>
+            <a:r>
+              <a:rPr lang="en-US" dirty="0" smtClean="0"/>
+              <a:t>8) </a:t>
+            </a:r>
+            <a:r>
+              <a:rPr lang="en-US" dirty="0"/>
+              <a:t>Checkmark </a:t>
+            </a:r>
+            <a:r>
+              <a:rPr lang="en-US" dirty="0" smtClean="0"/>
+              <a:t>Icon:		Button to confirm changes to editing a account</a:t>
+            </a:r>
+          </a:p>
+        </p:txBody>
+      </p:sp>
+      <p:sp>
+        <p:nvSpPr>
+          <p:cNvPr id="3" name="TextBox 2"/>
+          <p:cNvSpPr txBox="1"/>
+          <p:nvPr/>
+        </p:nvSpPr>
+        <p:spPr>
+          <a:xfrm>
+            <a:off x="1229866" y="2927866"/>
+            <a:ext cx="304800" cy="369332"/>
+          </a:xfrm>
+          <a:prstGeom prst="rect">
+            <a:avLst/>
+          </a:prstGeom>
+          <a:noFill/>
+        </p:spPr>
+        <p:txBody>
+          <a:bodyPr wrap="square" rtlCol="0">
+            <a:spAutoFit/>
+          </a:bodyPr>
+          <a:lstStyle/>
+          <a:p>
+            <a:r>
+              <a:rPr lang="en-US" dirty="0" smtClean="0">
+                <a:solidFill>
+                  <a:srgbClr val="FF0000"/>
+                </a:solidFill>
+              </a:rPr>
+              <a:t>1</a:t>
+            </a:r>
+            <a:endParaRPr lang="en-US" dirty="0">
+              <a:solidFill>
+                <a:srgbClr val="FF0000"/>
+              </a:solidFill>
+            </a:endParaRPr>
+          </a:p>
+        </p:txBody>
+      </p:sp>
+      <p:sp>
+        <p:nvSpPr>
+          <p:cNvPr id="7" name="TextBox 6"/>
+          <p:cNvSpPr txBox="1"/>
+          <p:nvPr/>
+        </p:nvSpPr>
+        <p:spPr>
+          <a:xfrm>
+            <a:off x="4038600" y="2947069"/>
+            <a:ext cx="304800" cy="369332"/>
+          </a:xfrm>
+          <a:prstGeom prst="rect">
+            <a:avLst/>
+          </a:prstGeom>
+          <a:noFill/>
+        </p:spPr>
+        <p:txBody>
+          <a:bodyPr wrap="square" rtlCol="0">
+            <a:spAutoFit/>
+          </a:bodyPr>
+          <a:lstStyle/>
+          <a:p>
+            <a:r>
+              <a:rPr lang="en-US" dirty="0" smtClean="0">
+                <a:solidFill>
+                  <a:srgbClr val="FF0000"/>
+                </a:solidFill>
+              </a:rPr>
+              <a:t>2</a:t>
+            </a:r>
+            <a:endParaRPr lang="en-US" dirty="0">
+              <a:solidFill>
+                <a:srgbClr val="FF0000"/>
+              </a:solidFill>
+            </a:endParaRPr>
+          </a:p>
+        </p:txBody>
+      </p:sp>
+      <p:sp>
+        <p:nvSpPr>
+          <p:cNvPr id="9" name="TextBox 8"/>
+          <p:cNvSpPr txBox="1"/>
+          <p:nvPr/>
+        </p:nvSpPr>
+        <p:spPr>
+          <a:xfrm>
+            <a:off x="4648200" y="2927866"/>
+            <a:ext cx="304800" cy="369332"/>
+          </a:xfrm>
+          <a:prstGeom prst="rect">
+            <a:avLst/>
+          </a:prstGeom>
+          <a:noFill/>
+        </p:spPr>
+        <p:txBody>
+          <a:bodyPr wrap="square" rtlCol="0">
+            <a:spAutoFit/>
+          </a:bodyPr>
+          <a:lstStyle/>
+          <a:p>
+            <a:r>
+              <a:rPr lang="en-US" dirty="0" smtClean="0">
+                <a:solidFill>
+                  <a:srgbClr val="FF0000"/>
+                </a:solidFill>
+              </a:rPr>
+              <a:t>3</a:t>
+            </a:r>
+            <a:endParaRPr lang="en-US" dirty="0">
+              <a:solidFill>
+                <a:srgbClr val="FF0000"/>
+              </a:solidFill>
+            </a:endParaRPr>
+          </a:p>
+        </p:txBody>
+      </p:sp>
+      <p:sp>
+        <p:nvSpPr>
+          <p:cNvPr id="10" name="TextBox 9"/>
+          <p:cNvSpPr txBox="1"/>
+          <p:nvPr/>
+        </p:nvSpPr>
+        <p:spPr>
+          <a:xfrm>
+            <a:off x="5257800" y="2927866"/>
+            <a:ext cx="304800" cy="369332"/>
+          </a:xfrm>
+          <a:prstGeom prst="rect">
+            <a:avLst/>
+          </a:prstGeom>
+          <a:noFill/>
+        </p:spPr>
+        <p:txBody>
+          <a:bodyPr wrap="square" rtlCol="0">
+            <a:spAutoFit/>
+          </a:bodyPr>
+          <a:lstStyle/>
+          <a:p>
+            <a:r>
+              <a:rPr lang="en-US" dirty="0" smtClean="0">
+                <a:solidFill>
+                  <a:srgbClr val="FF0000"/>
+                </a:solidFill>
+              </a:rPr>
+              <a:t>4</a:t>
+            </a:r>
+            <a:endParaRPr lang="en-US" dirty="0">
+              <a:solidFill>
+                <a:srgbClr val="FF0000"/>
+              </a:solidFill>
+            </a:endParaRPr>
+          </a:p>
+        </p:txBody>
+      </p:sp>
+      <p:sp>
+        <p:nvSpPr>
+          <p:cNvPr id="11" name="TextBox 10"/>
+          <p:cNvSpPr txBox="1"/>
+          <p:nvPr/>
+        </p:nvSpPr>
+        <p:spPr>
+          <a:xfrm>
+            <a:off x="5474426" y="2908663"/>
+            <a:ext cx="859318" cy="369332"/>
+          </a:xfrm>
+          <a:prstGeom prst="rect">
+            <a:avLst/>
+          </a:prstGeom>
+          <a:noFill/>
+        </p:spPr>
+        <p:txBody>
+          <a:bodyPr wrap="square" rtlCol="0">
+            <a:spAutoFit/>
+          </a:bodyPr>
+          <a:lstStyle/>
+          <a:p>
+            <a:r>
+              <a:rPr lang="en-US" dirty="0" smtClean="0">
+                <a:solidFill>
+                  <a:srgbClr val="FF0000"/>
+                </a:solidFill>
+              </a:rPr>
+              <a:t>6, 7, 8</a:t>
+            </a:r>
+            <a:endParaRPr lang="en-US" dirty="0">
+              <a:solidFill>
+                <a:srgbClr val="FF0000"/>
+              </a:solidFill>
+            </a:endParaRPr>
+          </a:p>
+        </p:txBody>
+      </p:sp>
+      <p:sp>
+        <p:nvSpPr>
+          <p:cNvPr id="12" name="TextBox 11"/>
+          <p:cNvSpPr txBox="1"/>
+          <p:nvPr/>
+        </p:nvSpPr>
+        <p:spPr>
+          <a:xfrm>
+            <a:off x="5562600" y="2030824"/>
+            <a:ext cx="304800" cy="369332"/>
+          </a:xfrm>
+          <a:prstGeom prst="rect">
+            <a:avLst/>
+          </a:prstGeom>
+          <a:noFill/>
+        </p:spPr>
+        <p:txBody>
+          <a:bodyPr wrap="square" rtlCol="0">
+            <a:spAutoFit/>
+          </a:bodyPr>
+          <a:lstStyle/>
+          <a:p>
+            <a:r>
+              <a:rPr lang="en-US" dirty="0">
+                <a:solidFill>
+                  <a:srgbClr val="FF0000"/>
+                </a:solidFill>
+              </a:rPr>
+              <a:t>5</a:t>
+            </a:r>
           </a:p>
         </p:txBody>
       </p:sp>
     </p:spTree>
     <p:extLst>
       <p:ext uri="{BB962C8B-B14F-4D97-AF65-F5344CB8AC3E}">
-        <p14:creationId xmlns:p14="http://schemas.microsoft.com/office/powerpoint/2010/main" val="975224680"/>
+        <p14:creationId xmlns:p14="http://schemas.microsoft.com/office/powerpoint/2010/main" val="2726016591"/>
       </p:ext>
     </p:extLst>
   </p:cSld>
@@ -3717,7 +4064,7 @@
           <a:p>
             <a:r>
               <a:rPr lang="en-US" dirty="0" smtClean="0"/>
-              <a:t>Accounts page</a:t>
+              <a:t>Reports page</a:t>
             </a:r>
             <a:endParaRPr lang="en-US" dirty="0"/>
           </a:p>
@@ -3739,8 +4086,8 @@
         </p:blipFill>
         <p:spPr>
           <a:xfrm>
-            <a:off x="76946" y="1528612"/>
-            <a:ext cx="9067054" cy="2433788"/>
+            <a:off x="152400" y="1514199"/>
+            <a:ext cx="8763000" cy="2143401"/>
           </a:xfrm>
           <a:prstGeom prst="rect">
             <a:avLst/>
@@ -3756,7 +4103,7 @@
         <p:spPr>
           <a:xfrm>
             <a:off x="419100" y="3870476"/>
-            <a:ext cx="8305800" cy="646331"/>
+            <a:ext cx="8305800" cy="923330"/>
           </a:xfrm>
           <a:prstGeom prst="rect">
             <a:avLst/>
@@ -3771,15 +4118,161 @@
           <a:p>
             <a:r>
               <a:rPr lang="en-US" dirty="0" smtClean="0"/>
-              <a:t>The initial view of the accounts page consists of an empty list of accounts and an account summary, which displays pertinent information about the accounts.</a:t>
-            </a:r>
+              <a:t>1) Extra </a:t>
+            </a:r>
+            <a:r>
+              <a:rPr lang="en-US" dirty="0" smtClean="0"/>
+              <a:t>Payment:		Field for entering additional payment</a:t>
+            </a:r>
+          </a:p>
+          <a:p>
+            <a:r>
+              <a:rPr lang="en-US" dirty="0" smtClean="0"/>
+              <a:t>2) Algorithm</a:t>
+            </a:r>
+            <a:r>
+              <a:rPr lang="en-US" dirty="0" smtClean="0"/>
+              <a:t>:		Drop-down menu for choosing payment algorithm</a:t>
+            </a:r>
+          </a:p>
+          <a:p>
+            <a:r>
+              <a:rPr lang="en-US" dirty="0" smtClean="0"/>
+              <a:t>3) Generate </a:t>
+            </a:r>
+            <a:r>
+              <a:rPr lang="en-US" dirty="0" smtClean="0"/>
+              <a:t>Report:	</a:t>
+            </a:r>
+            <a:r>
+              <a:rPr lang="en-US" dirty="0" smtClean="0"/>
+              <a:t>Button </a:t>
+            </a:r>
+            <a:r>
+              <a:rPr lang="en-US" dirty="0" smtClean="0"/>
+              <a:t>for generating the report</a:t>
+            </a:r>
+          </a:p>
+        </p:txBody>
+      </p:sp>
+      <p:sp>
+        <p:nvSpPr>
+          <p:cNvPr id="7" name="TextBox 6"/>
+          <p:cNvSpPr txBox="1"/>
+          <p:nvPr/>
+        </p:nvSpPr>
+        <p:spPr>
+          <a:xfrm>
+            <a:off x="7239000" y="2505137"/>
+            <a:ext cx="304800" cy="369332"/>
+          </a:xfrm>
+          <a:prstGeom prst="rect">
+            <a:avLst/>
+          </a:prstGeom>
+          <a:noFill/>
+        </p:spPr>
+        <p:txBody>
+          <a:bodyPr wrap="square" rtlCol="0">
+            <a:spAutoFit/>
+          </a:bodyPr>
+          <a:lstStyle/>
+          <a:p>
+            <a:r>
+              <a:rPr lang="en-US" dirty="0" smtClean="0">
+                <a:solidFill>
+                  <a:srgbClr val="FF0000"/>
+                </a:solidFill>
+              </a:rPr>
+              <a:t>1</a:t>
+            </a:r>
+            <a:endParaRPr lang="en-US" dirty="0">
+              <a:solidFill>
+                <a:srgbClr val="FF0000"/>
+              </a:solidFill>
+            </a:endParaRPr>
+          </a:p>
+        </p:txBody>
+      </p:sp>
+      <p:sp>
+        <p:nvSpPr>
+          <p:cNvPr id="8" name="TextBox 7"/>
+          <p:cNvSpPr txBox="1"/>
+          <p:nvPr/>
+        </p:nvSpPr>
+        <p:spPr>
+          <a:xfrm>
+            <a:off x="7239000" y="2768628"/>
+            <a:ext cx="304800" cy="369332"/>
+          </a:xfrm>
+          <a:prstGeom prst="rect">
+            <a:avLst/>
+          </a:prstGeom>
+          <a:noFill/>
+        </p:spPr>
+        <p:txBody>
+          <a:bodyPr wrap="square" rtlCol="0">
+            <a:spAutoFit/>
+          </a:bodyPr>
+          <a:lstStyle/>
+          <a:p>
+            <a:r>
+              <a:rPr lang="en-US" dirty="0" smtClean="0">
+                <a:solidFill>
+                  <a:srgbClr val="FF0000"/>
+                </a:solidFill>
+              </a:rPr>
+              <a:t>2</a:t>
+            </a:r>
+            <a:endParaRPr lang="en-US" dirty="0">
+              <a:solidFill>
+                <a:srgbClr val="FF0000"/>
+              </a:solidFill>
+            </a:endParaRPr>
+          </a:p>
+        </p:txBody>
+      </p:sp>
+      <p:sp>
+        <p:nvSpPr>
+          <p:cNvPr id="9" name="TextBox 8"/>
+          <p:cNvSpPr txBox="1"/>
+          <p:nvPr/>
+        </p:nvSpPr>
+        <p:spPr>
+          <a:xfrm>
+            <a:off x="3505200" y="2953294"/>
+            <a:ext cx="304800" cy="369332"/>
+          </a:xfrm>
+          <a:prstGeom prst="rect">
+            <a:avLst/>
+          </a:prstGeom>
+          <a:noFill/>
+        </p:spPr>
+        <p:txBody>
+          <a:bodyPr wrap="square" rtlCol="0">
+            <a:spAutoFit/>
+          </a:bodyPr>
+          <a:lstStyle/>
+          <a:p>
+            <a:r>
+              <a:rPr lang="en-US" dirty="0" smtClean="0">
+                <a:solidFill>
+                  <a:srgbClr val="FF0000"/>
+                </a:solidFill>
+              </a:rPr>
+              <a:t>3</a:t>
+            </a:r>
+            <a:endParaRPr lang="en-US" dirty="0">
+              <a:solidFill>
+                <a:srgbClr val="FF0000"/>
+              </a:solidFill>
+            </a:endParaRPr>
           </a:p>
         </p:txBody>
       </p:sp>
     </p:spTree>
     <p:extLst>
       <p:ext uri="{BB962C8B-B14F-4D97-AF65-F5344CB8AC3E}">
-        <p14:creationId xmlns:p14="http://schemas.microsoft.com/office/powerpoint/2010/main" val="2170318299"/>
+        <p14:creationId xmlns:p14="http://schemas.microsoft.com/office/powerpoint/2010/main" val="405718158"/>
       </p:ext>
     </p:extLst>
   </p:cSld>
@@ -3818,466 +4311,6 @@
         </p:nvSpPr>
         <p:spPr/>
         <p:txBody>
-          <a:bodyPr/>
-          <a:lstStyle/>
-          <a:p>
-            <a:r>
-              <a:rPr lang="en-US" dirty="0" smtClean="0"/>
-              <a:t>Accounts page – Adding accounts</a:t>
-            </a:r>
-            <a:endParaRPr lang="en-US" dirty="0"/>
-          </a:p>
-        </p:txBody>
-      </p:sp>
-      <p:pic>
-        <p:nvPicPr>
-          <p:cNvPr id="6" name="Picture 5"/>
-          <p:cNvPicPr>
-            <a:picLocks noChangeAspect="1"/>
-          </p:cNvPicPr>
-          <p:nvPr/>
-        </p:nvPicPr>
-        <p:blipFill>
-          <a:blip r:embed="rId3"/>
-          <a:stretch>
-            <a:fillRect/>
-          </a:stretch>
-        </p:blipFill>
-        <p:spPr>
-          <a:xfrm>
-            <a:off x="118435" y="1524000"/>
-            <a:ext cx="8907129" cy="1813287"/>
-          </a:xfrm>
-          <a:prstGeom prst="rect">
-            <a:avLst/>
-          </a:prstGeom>
-        </p:spPr>
-      </p:pic>
-      <p:sp>
-        <p:nvSpPr>
-          <p:cNvPr id="8" name="TextBox 7"/>
-          <p:cNvSpPr txBox="1"/>
-          <p:nvPr/>
-        </p:nvSpPr>
-        <p:spPr>
-          <a:xfrm>
-            <a:off x="419100" y="3870476"/>
-            <a:ext cx="8305800" cy="1477328"/>
-          </a:xfrm>
-          <a:prstGeom prst="rect">
-            <a:avLst/>
-          </a:prstGeom>
-          <a:noFill/>
-        </p:spPr>
-        <p:txBody>
-          <a:bodyPr wrap="square" rtlCol="0">
-            <a:spAutoFit/>
-          </a:bodyPr>
-          <a:lstStyle/>
-          <a:p>
-            <a:r>
-              <a:rPr lang="en-US" dirty="0" smtClean="0"/>
-              <a:t>To add an account, click the blue “Add Account” button. When done, you will be given an entry with four text boxes to fill out: Name, APR, Current Balance, and Monthly Payment.</a:t>
-            </a:r>
-          </a:p>
-          <a:p>
-            <a:r>
-              <a:rPr lang="en-US" dirty="0" smtClean="0"/>
-              <a:t>When all the fields are filled out to your liking, click the check mark to confirm the account.</a:t>
-            </a:r>
-          </a:p>
-        </p:txBody>
-      </p:sp>
-    </p:spTree>
-    <p:extLst>
-      <p:ext uri="{BB962C8B-B14F-4D97-AF65-F5344CB8AC3E}">
-        <p14:creationId xmlns:p14="http://schemas.microsoft.com/office/powerpoint/2010/main" val="2726016591"/>
-      </p:ext>
-    </p:extLst>
-  </p:cSld>
-  <p:clrMapOvr>
-    <a:masterClrMapping/>
-  </p:clrMapOvr>
-</p:sld>
-</file>
-
-<file path=ppt/slides/slide5.xml><?xml version="1.0" encoding="utf-8"?>
-<p:sld xmlns:a="http://schemas.openxmlformats.org/drawingml/2006/main" xmlns:r="http://schemas.openxmlformats.org/officeDocument/2006/relationships" xmlns:p="http://schemas.openxmlformats.org/presentationml/2006/main">
-  <p:cSld>
-    <p:spTree>
-      <p:nvGrpSpPr>
-        <p:cNvPr id="1" name=""/>
-        <p:cNvGrpSpPr/>
-        <p:nvPr/>
-      </p:nvGrpSpPr>
-      <p:grpSpPr>
-        <a:xfrm>
-          <a:off x="0" y="0"/>
-          <a:ext cx="0" cy="0"/>
-          <a:chOff x="0" y="0"/>
-          <a:chExt cx="0" cy="0"/>
-        </a:xfrm>
-      </p:grpSpPr>
-      <p:sp>
-        <p:nvSpPr>
-          <p:cNvPr id="2" name="Title 1"/>
-          <p:cNvSpPr>
-            <a:spLocks noGrp="1"/>
-          </p:cNvSpPr>
-          <p:nvPr>
-            <p:ph type="title"/>
-          </p:nvPr>
-        </p:nvSpPr>
-        <p:spPr/>
-        <p:txBody>
-          <a:bodyPr>
-            <a:normAutofit fontScale="90000"/>
-          </a:bodyPr>
-          <a:lstStyle/>
-          <a:p>
-            <a:r>
-              <a:rPr lang="en-US" dirty="0" smtClean="0"/>
-              <a:t>Accounts page – Editing and deleting accounts</a:t>
-            </a:r>
-            <a:endParaRPr lang="en-US" dirty="0"/>
-          </a:p>
-        </p:txBody>
-      </p:sp>
-      <p:sp>
-        <p:nvSpPr>
-          <p:cNvPr id="5" name="TextBox 4"/>
-          <p:cNvSpPr txBox="1"/>
-          <p:nvPr/>
-        </p:nvSpPr>
-        <p:spPr>
-          <a:xfrm>
-            <a:off x="419100" y="3870476"/>
-            <a:ext cx="8305800" cy="1477328"/>
-          </a:xfrm>
-          <a:prstGeom prst="rect">
-            <a:avLst/>
-          </a:prstGeom>
-          <a:noFill/>
-        </p:spPr>
-        <p:txBody>
-          <a:bodyPr wrap="square" rtlCol="0">
-            <a:spAutoFit/>
-          </a:bodyPr>
-          <a:lstStyle/>
-          <a:p>
-            <a:r>
-              <a:rPr lang="en-US" dirty="0" smtClean="0"/>
-              <a:t>To edit an account, click the pencil icon next to the account. When done editing the account, click the check mark again to confirm the account.</a:t>
-            </a:r>
-          </a:p>
-          <a:p>
-            <a:endParaRPr lang="en-US" dirty="0"/>
-          </a:p>
-          <a:p>
-            <a:r>
-              <a:rPr lang="en-US" dirty="0" smtClean="0"/>
-              <a:t>To delete an account, click the trash can icon next to the account. This will remove it from the list of accounts.</a:t>
-            </a:r>
-          </a:p>
-        </p:txBody>
-      </p:sp>
-      <p:pic>
-        <p:nvPicPr>
-          <p:cNvPr id="6" name="Picture 5"/>
-          <p:cNvPicPr>
-            <a:picLocks noChangeAspect="1"/>
-          </p:cNvPicPr>
-          <p:nvPr/>
-        </p:nvPicPr>
-        <p:blipFill>
-          <a:blip r:embed="rId2"/>
-          <a:stretch>
-            <a:fillRect/>
-          </a:stretch>
-        </p:blipFill>
-        <p:spPr>
-          <a:xfrm>
-            <a:off x="109538" y="1524000"/>
-            <a:ext cx="8782870" cy="1828800"/>
-          </a:xfrm>
-          <a:prstGeom prst="rect">
-            <a:avLst/>
-          </a:prstGeom>
-        </p:spPr>
-      </p:pic>
-    </p:spTree>
-    <p:extLst>
-      <p:ext uri="{BB962C8B-B14F-4D97-AF65-F5344CB8AC3E}">
-        <p14:creationId xmlns:p14="http://schemas.microsoft.com/office/powerpoint/2010/main" val="1531781182"/>
-      </p:ext>
-    </p:extLst>
-  </p:cSld>
-  <p:clrMapOvr>
-    <a:masterClrMapping/>
-  </p:clrMapOvr>
-</p:sld>
-</file>
-
-<file path=ppt/slides/slide6.xml><?xml version="1.0" encoding="utf-8"?>
-<p:sld xmlns:a="http://schemas.openxmlformats.org/drawingml/2006/main" xmlns:r="http://schemas.openxmlformats.org/officeDocument/2006/relationships" xmlns:p="http://schemas.openxmlformats.org/presentationml/2006/main">
-  <p:cSld>
-    <p:spTree>
-      <p:nvGrpSpPr>
-        <p:cNvPr id="1" name=""/>
-        <p:cNvGrpSpPr/>
-        <p:nvPr/>
-      </p:nvGrpSpPr>
-      <p:grpSpPr>
-        <a:xfrm>
-          <a:off x="0" y="0"/>
-          <a:ext cx="0" cy="0"/>
-          <a:chOff x="0" y="0"/>
-          <a:chExt cx="0" cy="0"/>
-        </a:xfrm>
-      </p:grpSpPr>
-      <p:sp>
-        <p:nvSpPr>
-          <p:cNvPr id="2" name="Title 1"/>
-          <p:cNvSpPr>
-            <a:spLocks noGrp="1"/>
-          </p:cNvSpPr>
-          <p:nvPr>
-            <p:ph type="title"/>
-          </p:nvPr>
-        </p:nvSpPr>
-        <p:spPr/>
-        <p:txBody>
-          <a:bodyPr/>
-          <a:lstStyle/>
-          <a:p>
-            <a:r>
-              <a:rPr lang="en-US" dirty="0" smtClean="0"/>
-              <a:t>Reports page</a:t>
-            </a:r>
-            <a:endParaRPr lang="en-US" dirty="0"/>
-          </a:p>
-        </p:txBody>
-      </p:sp>
-      <p:pic>
-        <p:nvPicPr>
-          <p:cNvPr id="5" name="Picture 4"/>
-          <p:cNvPicPr>
-            <a:picLocks noChangeAspect="1"/>
-          </p:cNvPicPr>
-          <p:nvPr/>
-        </p:nvPicPr>
-        <p:blipFill>
-          <a:blip r:embed="rId2"/>
-          <a:stretch>
-            <a:fillRect/>
-          </a:stretch>
-        </p:blipFill>
-        <p:spPr>
-          <a:xfrm>
-            <a:off x="152400" y="1514199"/>
-            <a:ext cx="8763000" cy="2143401"/>
-          </a:xfrm>
-          <a:prstGeom prst="rect">
-            <a:avLst/>
-          </a:prstGeom>
-        </p:spPr>
-      </p:pic>
-      <p:sp>
-        <p:nvSpPr>
-          <p:cNvPr id="6" name="TextBox 5"/>
-          <p:cNvSpPr txBox="1"/>
-          <p:nvPr/>
-        </p:nvSpPr>
-        <p:spPr>
-          <a:xfrm>
-            <a:off x="419100" y="3870476"/>
-            <a:ext cx="8305800" cy="923330"/>
-          </a:xfrm>
-          <a:prstGeom prst="rect">
-            <a:avLst/>
-          </a:prstGeom>
-          <a:noFill/>
-        </p:spPr>
-        <p:txBody>
-          <a:bodyPr wrap="square" rtlCol="0">
-            <a:spAutoFit/>
-          </a:bodyPr>
-          <a:lstStyle/>
-          <a:p>
-            <a:r>
-              <a:rPr lang="en-US" dirty="0" smtClean="0"/>
-              <a:t>The Reports page is made up of all the information relevant to the accounts listed on the previous page. The Initial view of the reports page will consist of two fields to be filled out before generating the report.</a:t>
-            </a:r>
-          </a:p>
-        </p:txBody>
-      </p:sp>
-    </p:spTree>
-    <p:extLst>
-      <p:ext uri="{BB962C8B-B14F-4D97-AF65-F5344CB8AC3E}">
-        <p14:creationId xmlns:p14="http://schemas.microsoft.com/office/powerpoint/2010/main" val="405718158"/>
-      </p:ext>
-    </p:extLst>
-  </p:cSld>
-  <p:clrMapOvr>
-    <a:masterClrMapping/>
-  </p:clrMapOvr>
-</p:sld>
-</file>
-
-<file path=ppt/slides/slide7.xml><?xml version="1.0" encoding="utf-8"?>
-<p:sld xmlns:a="http://schemas.openxmlformats.org/drawingml/2006/main" xmlns:r="http://schemas.openxmlformats.org/officeDocument/2006/relationships" xmlns:p="http://schemas.openxmlformats.org/presentationml/2006/main">
-  <p:cSld>
-    <p:spTree>
-      <p:nvGrpSpPr>
-        <p:cNvPr id="1" name=""/>
-        <p:cNvGrpSpPr/>
-        <p:nvPr/>
-      </p:nvGrpSpPr>
-      <p:grpSpPr>
-        <a:xfrm>
-          <a:off x="0" y="0"/>
-          <a:ext cx="0" cy="0"/>
-          <a:chOff x="0" y="0"/>
-          <a:chExt cx="0" cy="0"/>
-        </a:xfrm>
-      </p:grpSpPr>
-      <p:sp>
-        <p:nvSpPr>
-          <p:cNvPr id="2" name="Title 1"/>
-          <p:cNvSpPr>
-            <a:spLocks noGrp="1"/>
-          </p:cNvSpPr>
-          <p:nvPr>
-            <p:ph type="title"/>
-          </p:nvPr>
-        </p:nvSpPr>
-        <p:spPr/>
-        <p:txBody>
-          <a:bodyPr>
-            <a:normAutofit fontScale="90000"/>
-          </a:bodyPr>
-          <a:lstStyle/>
-          <a:p>
-            <a:r>
-              <a:rPr lang="en-US" dirty="0" smtClean="0"/>
-              <a:t>Reports page – Extra payment and algorithm style</a:t>
-            </a:r>
-            <a:endParaRPr lang="en-US" dirty="0"/>
-          </a:p>
-        </p:txBody>
-      </p:sp>
-      <p:pic>
-        <p:nvPicPr>
-          <p:cNvPr id="5" name="Picture 4"/>
-          <p:cNvPicPr>
-            <a:picLocks noChangeAspect="1"/>
-          </p:cNvPicPr>
-          <p:nvPr/>
-        </p:nvPicPr>
-        <p:blipFill>
-          <a:blip r:embed="rId2"/>
-          <a:stretch>
-            <a:fillRect/>
-          </a:stretch>
-        </p:blipFill>
-        <p:spPr>
-          <a:xfrm>
-            <a:off x="152400" y="1524000"/>
-            <a:ext cx="8839200" cy="2566669"/>
-          </a:xfrm>
-          <a:prstGeom prst="rect">
-            <a:avLst/>
-          </a:prstGeom>
-        </p:spPr>
-      </p:pic>
-      <p:sp>
-        <p:nvSpPr>
-          <p:cNvPr id="6" name="TextBox 5"/>
-          <p:cNvSpPr txBox="1"/>
-          <p:nvPr/>
-        </p:nvSpPr>
-        <p:spPr>
-          <a:xfrm>
-            <a:off x="419100" y="3870476"/>
-            <a:ext cx="8305800" cy="1477328"/>
-          </a:xfrm>
-          <a:prstGeom prst="rect">
-            <a:avLst/>
-          </a:prstGeom>
-          <a:noFill/>
-        </p:spPr>
-        <p:txBody>
-          <a:bodyPr wrap="square" rtlCol="0">
-            <a:spAutoFit/>
-          </a:bodyPr>
-          <a:lstStyle/>
-          <a:p>
-            <a:r>
-              <a:rPr lang="en-US" dirty="0" smtClean="0"/>
-              <a:t>The extra payment is the total amount of money </a:t>
-            </a:r>
-            <a:r>
-              <a:rPr lang="en-US" dirty="0"/>
-              <a:t>to be applied above the accounts' minimum </a:t>
-            </a:r>
-            <a:r>
-              <a:rPr lang="en-US" dirty="0" smtClean="0"/>
-              <a:t>payments on a monthly basis.</a:t>
-            </a:r>
-          </a:p>
-          <a:p>
-            <a:endParaRPr lang="en-US" dirty="0"/>
-          </a:p>
-          <a:p>
-            <a:r>
-              <a:rPr lang="en-US" dirty="0" smtClean="0"/>
-              <a:t>The algorithm is how the extra payment is distributed. It can be set to lowest balance, highest interest, or a mix of the two.</a:t>
-            </a:r>
-          </a:p>
-        </p:txBody>
-      </p:sp>
-    </p:spTree>
-    <p:extLst>
-      <p:ext uri="{BB962C8B-B14F-4D97-AF65-F5344CB8AC3E}">
-        <p14:creationId xmlns:p14="http://schemas.microsoft.com/office/powerpoint/2010/main" val="2835351557"/>
-      </p:ext>
-    </p:extLst>
-  </p:cSld>
-  <p:clrMapOvr>
-    <a:masterClrMapping/>
-  </p:clrMapOvr>
-</p:sld>
-</file>
-
-<file path=ppt/slides/slide8.xml><?xml version="1.0" encoding="utf-8"?>
-<p:sld xmlns:a="http://schemas.openxmlformats.org/drawingml/2006/main" xmlns:r="http://schemas.openxmlformats.org/officeDocument/2006/relationships" xmlns:p="http://schemas.openxmlformats.org/presentationml/2006/main">
-  <p:cSld>
-    <p:spTree>
-      <p:nvGrpSpPr>
-        <p:cNvPr id="1" name=""/>
-        <p:cNvGrpSpPr/>
-        <p:nvPr/>
-      </p:nvGrpSpPr>
-      <p:grpSpPr>
-        <a:xfrm>
-          <a:off x="0" y="0"/>
-          <a:ext cx="0" cy="0"/>
-          <a:chOff x="0" y="0"/>
-          <a:chExt cx="0" cy="0"/>
-        </a:xfrm>
-      </p:grpSpPr>
-      <p:sp>
-        <p:nvSpPr>
-          <p:cNvPr id="2" name="Title 1"/>
-          <p:cNvSpPr>
-            <a:spLocks noGrp="1"/>
-          </p:cNvSpPr>
-          <p:nvPr>
-            <p:ph type="title"/>
-          </p:nvPr>
-        </p:nvSpPr>
-        <p:spPr/>
-        <p:txBody>
           <a:bodyPr>
             <a:normAutofit/>
           </a:bodyPr>
@@ -4328,7 +4361,7 @@
         <p:spPr>
           <a:xfrm>
             <a:off x="419100" y="5030787"/>
-            <a:ext cx="8305800" cy="923330"/>
+            <a:ext cx="8305800" cy="646331"/>
           </a:xfrm>
           <a:prstGeom prst="rect">
             <a:avLst/>
@@ -4343,8 +4376,106 @@
           <a:p>
             <a:r>
               <a:rPr lang="en-US" dirty="0" smtClean="0"/>
-              <a:t>The report is made up of two parts, a graph showing the projected balances over a period from start to when all balances are paid off and a month by month table showing the total interest as well as each account’s amount at that month.</a:t>
-            </a:r>
+              <a:t>1) Projected </a:t>
+            </a:r>
+            <a:r>
+              <a:rPr lang="en-US" dirty="0" smtClean="0"/>
+              <a:t>Balances:	</a:t>
+            </a:r>
+            <a:r>
+              <a:rPr lang="en-US" dirty="0" smtClean="0"/>
+              <a:t>A </a:t>
+            </a:r>
+            <a:r>
+              <a:rPr lang="en-US" dirty="0" smtClean="0"/>
+              <a:t>graphical representation of each account over time</a:t>
+            </a:r>
+          </a:p>
+          <a:p>
+            <a:r>
+              <a:rPr lang="en-US" dirty="0" smtClean="0"/>
+              <a:t>2) Monthly </a:t>
+            </a:r>
+            <a:r>
+              <a:rPr lang="en-US" dirty="0" smtClean="0"/>
+              <a:t>Report:		A month by month breakdown of each account over time</a:t>
+            </a:r>
+          </a:p>
+        </p:txBody>
+      </p:sp>
+      <p:sp>
+        <p:nvSpPr>
+          <p:cNvPr id="7" name="TextBox 6"/>
+          <p:cNvSpPr txBox="1"/>
+          <p:nvPr/>
+        </p:nvSpPr>
+        <p:spPr>
+          <a:xfrm>
+            <a:off x="1524000" y="1530531"/>
+            <a:ext cx="304800" cy="369332"/>
+          </a:xfrm>
+          <a:prstGeom prst="rect">
+            <a:avLst/>
+          </a:prstGeom>
+          <a:noFill/>
+        </p:spPr>
+        <p:txBody>
+          <a:bodyPr wrap="square" rtlCol="0">
+            <a:spAutoFit/>
+          </a:bodyPr>
+          <a:lstStyle/>
+          <a:p>
+            <a:r>
+              <a:rPr lang="en-US" dirty="0" smtClean="0">
+                <a:solidFill>
+                  <a:srgbClr val="FF0000"/>
+                </a:solidFill>
+              </a:rPr>
+              <a:t>1</a:t>
+            </a:r>
+            <a:endParaRPr lang="en-US" dirty="0">
+              <a:solidFill>
+                <a:srgbClr val="FF0000"/>
+              </a:solidFill>
+            </a:endParaRPr>
+          </a:p>
+        </p:txBody>
+      </p:sp>
+      <p:sp>
+        <p:nvSpPr>
+          <p:cNvPr id="8" name="TextBox 7"/>
+          <p:cNvSpPr txBox="1"/>
+          <p:nvPr/>
+        </p:nvSpPr>
+        <p:spPr>
+          <a:xfrm>
+            <a:off x="685800" y="3429000"/>
+            <a:ext cx="304800" cy="369332"/>
+          </a:xfrm>
+          <a:prstGeom prst="rect">
+            <a:avLst/>
+          </a:prstGeom>
+          <a:noFill/>
+        </p:spPr>
+        <p:txBody>
+          <a:bodyPr wrap="square" rtlCol="0">
+            <a:spAutoFit/>
+          </a:bodyPr>
+          <a:lstStyle/>
+          <a:p>
+            <a:r>
+              <a:rPr lang="en-US" dirty="0" smtClean="0">
+                <a:solidFill>
+                  <a:srgbClr val="FF0000"/>
+                </a:solidFill>
+              </a:rPr>
+              <a:t>2</a:t>
+            </a:r>
+            <a:endParaRPr lang="en-US" dirty="0">
+              <a:solidFill>
+                <a:srgbClr val="FF0000"/>
+              </a:solidFill>
+            </a:endParaRPr>
           </a:p>
         </p:txBody>
       </p:sp>

</xml_diff>